<commit_message>
add the reliable programming flowchart
</commit_message>
<xml_diff>
--- a/other/fastprog.pptx
+++ b/other/fastprog.pptx
@@ -5,7 +5,7 @@
     <p:sldMasterId id="2147483648" r:id="rId1"/>
   </p:sldMasterIdLst>
   <p:sldIdLst>
-    <p:sldId id="256" r:id="rId2"/>
+    <p:sldId id="257" r:id="rId2"/>
   </p:sldIdLst>
   <p:sldSz cx="9144000" cy="6858000" type="screen4x3"/>
   <p:notesSz cx="6858000" cy="9144000"/>
@@ -288,7 +288,7 @@
           <a:p>
             <a:fld id="{ECEBEA69-A1A2-4E1E-8049-3D8FDFFD1365}" type="datetimeFigureOut">
               <a:rPr lang="en-US" smtClean="0"/>
-              <a:t>9/9/2012</a:t>
+              <a:t>9/13/2012</a:t>
             </a:fld>
             <a:endParaRPr lang="en-US"/>
           </a:p>
@@ -453,7 +453,7 @@
           <a:p>
             <a:fld id="{ECEBEA69-A1A2-4E1E-8049-3D8FDFFD1365}" type="datetimeFigureOut">
               <a:rPr lang="en-US" smtClean="0"/>
-              <a:t>9/9/2012</a:t>
+              <a:t>9/13/2012</a:t>
             </a:fld>
             <a:endParaRPr lang="en-US"/>
           </a:p>
@@ -628,7 +628,7 @@
           <a:p>
             <a:fld id="{ECEBEA69-A1A2-4E1E-8049-3D8FDFFD1365}" type="datetimeFigureOut">
               <a:rPr lang="en-US" smtClean="0"/>
-              <a:t>9/9/2012</a:t>
+              <a:t>9/13/2012</a:t>
             </a:fld>
             <a:endParaRPr lang="en-US"/>
           </a:p>
@@ -793,7 +793,7 @@
           <a:p>
             <a:fld id="{ECEBEA69-A1A2-4E1E-8049-3D8FDFFD1365}" type="datetimeFigureOut">
               <a:rPr lang="en-US" smtClean="0"/>
-              <a:t>9/9/2012</a:t>
+              <a:t>9/13/2012</a:t>
             </a:fld>
             <a:endParaRPr lang="en-US"/>
           </a:p>
@@ -1034,7 +1034,7 @@
           <a:p>
             <a:fld id="{ECEBEA69-A1A2-4E1E-8049-3D8FDFFD1365}" type="datetimeFigureOut">
               <a:rPr lang="en-US" smtClean="0"/>
-              <a:t>9/9/2012</a:t>
+              <a:t>9/13/2012</a:t>
             </a:fld>
             <a:endParaRPr lang="en-US"/>
           </a:p>
@@ -1317,7 +1317,7 @@
           <a:p>
             <a:fld id="{ECEBEA69-A1A2-4E1E-8049-3D8FDFFD1365}" type="datetimeFigureOut">
               <a:rPr lang="en-US" smtClean="0"/>
-              <a:t>9/9/2012</a:t>
+              <a:t>9/13/2012</a:t>
             </a:fld>
             <a:endParaRPr lang="en-US"/>
           </a:p>
@@ -1734,7 +1734,7 @@
           <a:p>
             <a:fld id="{ECEBEA69-A1A2-4E1E-8049-3D8FDFFD1365}" type="datetimeFigureOut">
               <a:rPr lang="en-US" smtClean="0"/>
-              <a:t>9/9/2012</a:t>
+              <a:t>9/13/2012</a:t>
             </a:fld>
             <a:endParaRPr lang="en-US"/>
           </a:p>
@@ -1847,7 +1847,7 @@
           <a:p>
             <a:fld id="{ECEBEA69-A1A2-4E1E-8049-3D8FDFFD1365}" type="datetimeFigureOut">
               <a:rPr lang="en-US" smtClean="0"/>
-              <a:t>9/9/2012</a:t>
+              <a:t>9/13/2012</a:t>
             </a:fld>
             <a:endParaRPr lang="en-US"/>
           </a:p>
@@ -1937,7 +1937,7 @@
           <a:p>
             <a:fld id="{ECEBEA69-A1A2-4E1E-8049-3D8FDFFD1365}" type="datetimeFigureOut">
               <a:rPr lang="en-US" smtClean="0"/>
-              <a:t>9/9/2012</a:t>
+              <a:t>9/13/2012</a:t>
             </a:fld>
             <a:endParaRPr lang="en-US"/>
           </a:p>
@@ -2209,7 +2209,7 @@
           <a:p>
             <a:fld id="{ECEBEA69-A1A2-4E1E-8049-3D8FDFFD1365}" type="datetimeFigureOut">
               <a:rPr lang="en-US" smtClean="0"/>
-              <a:t>9/9/2012</a:t>
+              <a:t>9/13/2012</a:t>
             </a:fld>
             <a:endParaRPr lang="en-US"/>
           </a:p>
@@ -2457,7 +2457,7 @@
           <a:p>
             <a:fld id="{ECEBEA69-A1A2-4E1E-8049-3D8FDFFD1365}" type="datetimeFigureOut">
               <a:rPr lang="en-US" smtClean="0"/>
-              <a:t>9/9/2012</a:t>
+              <a:t>9/13/2012</a:t>
             </a:fld>
             <a:endParaRPr lang="en-US"/>
           </a:p>
@@ -2665,7 +2665,7 @@
           <a:p>
             <a:fld id="{ECEBEA69-A1A2-4E1E-8049-3D8FDFFD1365}" type="datetimeFigureOut">
               <a:rPr lang="en-US" smtClean="0"/>
-              <a:t>9/9/2012</a:t>
+              <a:t>9/13/2012</a:t>
             </a:fld>
             <a:endParaRPr lang="en-US"/>
           </a:p>
@@ -3068,34 +3068,58 @@
           <a:lstStyle/>
           <a:p>
             <a:r>
-              <a:rPr lang="en-US" sz="2400" dirty="0"/>
+              <a:rPr lang="en-US" sz="2400" dirty="0">
+                <a:latin typeface="Arial" pitchFamily="34" charset="0"/>
+                <a:cs typeface="Arial" pitchFamily="34" charset="0"/>
+              </a:rPr>
               <a:t>Check target </a:t>
             </a:r>
             <a:r>
-              <a:rPr lang="en-US" sz="2400" dirty="0" smtClean="0"/>
+              <a:rPr lang="en-US" sz="2400" dirty="0" smtClean="0">
+                <a:latin typeface="Arial" pitchFamily="34" charset="0"/>
+                <a:cs typeface="Arial" pitchFamily="34" charset="0"/>
+              </a:rPr>
               <a:t>state T</a:t>
             </a:r>
             <a:r>
-              <a:rPr lang="en-US" sz="2400" baseline="-25000" dirty="0" smtClean="0"/>
+              <a:rPr lang="en-US" sz="2400" baseline="-25000" dirty="0" smtClean="0">
+                <a:latin typeface="Arial" pitchFamily="34" charset="0"/>
+                <a:cs typeface="Arial" pitchFamily="34" charset="0"/>
+              </a:rPr>
               <a:t>2</a:t>
             </a:r>
             <a:r>
-              <a:rPr lang="en-US" sz="2400" dirty="0" smtClean="0"/>
+              <a:rPr lang="en-US" sz="2400" dirty="0" smtClean="0">
+                <a:latin typeface="Arial" pitchFamily="34" charset="0"/>
+                <a:cs typeface="Arial" pitchFamily="34" charset="0"/>
+              </a:rPr>
               <a:t>T</a:t>
             </a:r>
             <a:r>
-              <a:rPr lang="en-US" sz="2400" baseline="-25000" dirty="0" smtClean="0"/>
+              <a:rPr lang="en-US" sz="2400" baseline="-25000" dirty="0" smtClean="0">
+                <a:latin typeface="Arial" pitchFamily="34" charset="0"/>
+                <a:cs typeface="Arial" pitchFamily="34" charset="0"/>
+              </a:rPr>
               <a:t>1</a:t>
             </a:r>
             <a:r>
-              <a:rPr lang="en-US" sz="2400" dirty="0" smtClean="0"/>
+              <a:rPr lang="en-US" sz="2400" dirty="0" smtClean="0">
+                <a:latin typeface="Arial" pitchFamily="34" charset="0"/>
+                <a:cs typeface="Arial" pitchFamily="34" charset="0"/>
+              </a:rPr>
               <a:t>T</a:t>
             </a:r>
             <a:r>
-              <a:rPr lang="en-US" sz="2400" baseline="-25000" dirty="0" smtClean="0"/>
+              <a:rPr lang="en-US" sz="2400" baseline="-25000" dirty="0" smtClean="0">
+                <a:latin typeface="Arial" pitchFamily="34" charset="0"/>
+                <a:cs typeface="Arial" pitchFamily="34" charset="0"/>
+              </a:rPr>
               <a:t>0</a:t>
             </a:r>
-            <a:endParaRPr lang="en-US" sz="2400" baseline="-25000" dirty="0"/>
+            <a:endParaRPr lang="en-US" sz="2400" baseline="-25000" dirty="0">
+              <a:latin typeface="Arial" pitchFamily="34" charset="0"/>
+              <a:cs typeface="Arial" pitchFamily="34" charset="0"/>
+            </a:endParaRPr>
           </a:p>
         </p:txBody>
       </p:sp>
@@ -3132,34 +3156,58 @@
           <a:lstStyle/>
           <a:p>
             <a:r>
-              <a:rPr lang="en-US" sz="2400" dirty="0"/>
+              <a:rPr lang="en-US" sz="2400" dirty="0">
+                <a:latin typeface="Arial" pitchFamily="34" charset="0"/>
+                <a:cs typeface="Arial" pitchFamily="34" charset="0"/>
+              </a:rPr>
               <a:t>Read cell </a:t>
             </a:r>
             <a:r>
-              <a:rPr lang="en-US" sz="2400" dirty="0" smtClean="0"/>
+              <a:rPr lang="en-US" sz="2400" dirty="0" smtClean="0">
+                <a:latin typeface="Arial" pitchFamily="34" charset="0"/>
+                <a:cs typeface="Arial" pitchFamily="34" charset="0"/>
+              </a:rPr>
               <a:t>state C</a:t>
             </a:r>
             <a:r>
-              <a:rPr lang="en-US" sz="2400" baseline="-25000" dirty="0" smtClean="0"/>
+              <a:rPr lang="en-US" sz="2400" baseline="-25000" dirty="0" smtClean="0">
+                <a:latin typeface="Arial" pitchFamily="34" charset="0"/>
+                <a:cs typeface="Arial" pitchFamily="34" charset="0"/>
+              </a:rPr>
               <a:t>2</a:t>
             </a:r>
             <a:r>
-              <a:rPr lang="en-US" sz="2400" dirty="0" smtClean="0"/>
+              <a:rPr lang="en-US" sz="2400" dirty="0" smtClean="0">
+                <a:latin typeface="Arial" pitchFamily="34" charset="0"/>
+                <a:cs typeface="Arial" pitchFamily="34" charset="0"/>
+              </a:rPr>
               <a:t>C</a:t>
             </a:r>
             <a:r>
-              <a:rPr lang="en-US" sz="2400" baseline="-25000" dirty="0" smtClean="0"/>
+              <a:rPr lang="en-US" sz="2400" baseline="-25000" dirty="0" smtClean="0">
+                <a:latin typeface="Arial" pitchFamily="34" charset="0"/>
+                <a:cs typeface="Arial" pitchFamily="34" charset="0"/>
+              </a:rPr>
               <a:t>1</a:t>
             </a:r>
             <a:r>
-              <a:rPr lang="en-US" sz="2400" dirty="0" smtClean="0"/>
+              <a:rPr lang="en-US" sz="2400" dirty="0" smtClean="0">
+                <a:latin typeface="Arial" pitchFamily="34" charset="0"/>
+                <a:cs typeface="Arial" pitchFamily="34" charset="0"/>
+              </a:rPr>
               <a:t>C</a:t>
             </a:r>
             <a:r>
-              <a:rPr lang="en-US" sz="2400" baseline="-25000" dirty="0" smtClean="0"/>
+              <a:rPr lang="en-US" sz="2400" baseline="-25000" dirty="0" smtClean="0">
+                <a:latin typeface="Arial" pitchFamily="34" charset="0"/>
+                <a:cs typeface="Arial" pitchFamily="34" charset="0"/>
+              </a:rPr>
               <a:t>0</a:t>
             </a:r>
-            <a:endParaRPr lang="en-US" sz="2400" baseline="-25000" dirty="0"/>
+            <a:endParaRPr lang="en-US" sz="2400" baseline="-25000" dirty="0">
+              <a:latin typeface="Arial" pitchFamily="34" charset="0"/>
+              <a:cs typeface="Arial" pitchFamily="34" charset="0"/>
+            </a:endParaRPr>
           </a:p>
         </p:txBody>
       </p:sp>
@@ -3174,7 +3222,7 @@
         <p:spPr bwMode="auto">
           <a:xfrm>
             <a:off x="2356907" y="659296"/>
-            <a:ext cx="1058841" cy="461962"/>
+            <a:ext cx="1138079" cy="461651"/>
           </a:xfrm>
           <a:prstGeom prst="rect">
             <a:avLst/>
@@ -3196,10 +3244,16 @@
           <a:lstStyle/>
           <a:p>
             <a:r>
-              <a:rPr lang="en-US" sz="2400" dirty="0" smtClean="0"/>
+              <a:rPr lang="en-US" sz="2400" dirty="0" smtClean="0">
+                <a:latin typeface="Arial" pitchFamily="34" charset="0"/>
+                <a:cs typeface="Arial" pitchFamily="34" charset="0"/>
+              </a:rPr>
               <a:t>Equal?</a:t>
             </a:r>
-            <a:endParaRPr lang="en-US" sz="2400" dirty="0"/>
+            <a:endParaRPr lang="en-US" sz="2400" dirty="0">
+              <a:latin typeface="Arial" pitchFamily="34" charset="0"/>
+              <a:cs typeface="Arial" pitchFamily="34" charset="0"/>
+            </a:endParaRPr>
           </a:p>
         </p:txBody>
       </p:sp>
@@ -3216,7 +3270,7 @@
         <p:spPr bwMode="auto">
           <a:xfrm>
             <a:off x="1967948" y="460779"/>
-            <a:ext cx="388959" cy="429498"/>
+            <a:ext cx="388959" cy="429343"/>
           </a:xfrm>
           <a:prstGeom prst="straightConnector1">
             <a:avLst/>
@@ -3244,8 +3298,8 @@
         </p:nvCxnSpPr>
         <p:spPr bwMode="auto">
           <a:xfrm flipV="1">
-            <a:off x="1967948" y="890277"/>
-            <a:ext cx="388959" cy="467705"/>
+            <a:off x="1967948" y="890122"/>
+            <a:ext cx="388959" cy="467860"/>
           </a:xfrm>
           <a:prstGeom prst="straightConnector1">
             <a:avLst/>
@@ -3271,8 +3325,8 @@
         </p:nvSpPr>
         <p:spPr bwMode="auto">
           <a:xfrm>
-            <a:off x="4025348" y="278296"/>
-            <a:ext cx="914400" cy="461651"/>
+            <a:off x="3954092" y="278296"/>
+            <a:ext cx="1056911" cy="461651"/>
           </a:xfrm>
           <a:prstGeom prst="rect">
             <a:avLst/>
@@ -3294,15 +3348,24 @@
           <a:lstStyle/>
           <a:p>
             <a:r>
-              <a:rPr lang="en-US" sz="2400" dirty="0" smtClean="0"/>
+              <a:rPr lang="en-US" sz="2400" dirty="0" smtClean="0">
+                <a:latin typeface="Arial" pitchFamily="34" charset="0"/>
+                <a:cs typeface="Arial" pitchFamily="34" charset="0"/>
+              </a:rPr>
               <a:t>T</a:t>
             </a:r>
             <a:r>
-              <a:rPr lang="en-US" sz="2400" baseline="-25000" dirty="0" smtClean="0"/>
+              <a:rPr lang="en-US" sz="2400" baseline="-25000" dirty="0" smtClean="0">
+                <a:latin typeface="Arial" pitchFamily="34" charset="0"/>
+                <a:cs typeface="Arial" pitchFamily="34" charset="0"/>
+              </a:rPr>
               <a:t>2</a:t>
             </a:r>
             <a:r>
-              <a:rPr lang="en-US" sz="2400" dirty="0" smtClean="0"/>
+              <a:rPr lang="en-US" sz="2400" dirty="0" smtClean="0">
+                <a:latin typeface="Arial" pitchFamily="34" charset="0"/>
+                <a:cs typeface="Arial" pitchFamily="34" charset="0"/>
+              </a:rPr>
               <a:t>=1?</a:t>
             </a:r>
           </a:p>
@@ -3319,8 +3382,8 @@
         </p:nvCxnSpPr>
         <p:spPr bwMode="auto">
           <a:xfrm flipV="1">
-            <a:off x="3415748" y="506896"/>
-            <a:ext cx="609600" cy="383381"/>
+            <a:off x="3494986" y="515454"/>
+            <a:ext cx="454161" cy="374668"/>
           </a:xfrm>
           <a:prstGeom prst="straightConnector1">
             <a:avLst/>
@@ -3346,7 +3409,7 @@
         </p:nvSpPr>
         <p:spPr bwMode="auto">
           <a:xfrm>
-            <a:off x="3415748" y="251792"/>
+            <a:off x="3338142" y="251792"/>
             <a:ext cx="615950" cy="461651"/>
           </a:xfrm>
           <a:prstGeom prst="rect">
@@ -3367,7 +3430,10 @@
           <a:lstStyle/>
           <a:p>
             <a:r>
-              <a:rPr lang="en-US" sz="2400" dirty="0"/>
+              <a:rPr lang="en-US" sz="2400" dirty="0">
+                <a:latin typeface="Arial" pitchFamily="34" charset="0"/>
+                <a:cs typeface="Arial" pitchFamily="34" charset="0"/>
+              </a:rPr>
               <a:t>No</a:t>
             </a:r>
           </a:p>
@@ -3383,8 +3449,8 @@
         </p:nvSpPr>
         <p:spPr bwMode="auto">
           <a:xfrm>
-            <a:off x="2032772" y="1573696"/>
-            <a:ext cx="1717344" cy="461651"/>
+            <a:off x="2022417" y="1573696"/>
+            <a:ext cx="1820221" cy="461651"/>
           </a:xfrm>
           <a:prstGeom prst="rect">
             <a:avLst/>
@@ -3406,7 +3472,10 @@
           <a:lstStyle/>
           <a:p>
             <a:r>
-              <a:rPr lang="en-US" sz="2400" dirty="0"/>
+              <a:rPr lang="en-US" sz="2400" dirty="0">
+                <a:latin typeface="Arial" pitchFamily="34" charset="0"/>
+                <a:cs typeface="Arial" pitchFamily="34" charset="0"/>
+              </a:rPr>
               <a:t>Write saved</a:t>
             </a:r>
           </a:p>
@@ -3424,8 +3493,8 @@
         </p:nvCxnSpPr>
         <p:spPr bwMode="auto">
           <a:xfrm>
-            <a:off x="2886328" y="1121258"/>
-            <a:ext cx="5116" cy="452438"/>
+            <a:off x="2925947" y="1120947"/>
+            <a:ext cx="6581" cy="452749"/>
           </a:xfrm>
           <a:prstGeom prst="straightConnector1">
             <a:avLst/>
@@ -3451,8 +3520,8 @@
         </p:nvSpPr>
         <p:spPr bwMode="auto">
           <a:xfrm>
-            <a:off x="2879036" y="1139688"/>
-            <a:ext cx="615950" cy="461651"/>
+            <a:off x="2879035" y="1139688"/>
+            <a:ext cx="844687" cy="461651"/>
           </a:xfrm>
           <a:prstGeom prst="rect">
             <a:avLst/>
@@ -3466,13 +3535,16 @@
           </a:ln>
         </p:spPr>
         <p:txBody>
-          <a:bodyPr lIns="91427" tIns="45713" rIns="91427" bIns="45713">
+          <a:bodyPr wrap="square" lIns="91427" tIns="45713" rIns="91427" bIns="45713">
             <a:spAutoFit/>
           </a:bodyPr>
           <a:lstStyle/>
           <a:p>
             <a:r>
-              <a:rPr lang="en-US" sz="2400" dirty="0"/>
+              <a:rPr lang="en-US" sz="2400" dirty="0">
+                <a:latin typeface="Arial" pitchFamily="34" charset="0"/>
+                <a:cs typeface="Arial" pitchFamily="34" charset="0"/>
+              </a:rPr>
               <a:t>Yes</a:t>
             </a:r>
           </a:p>
@@ -3488,7 +3560,7 @@
         </p:nvSpPr>
         <p:spPr bwMode="auto">
           <a:xfrm>
-            <a:off x="4953000" y="39756"/>
+            <a:off x="4995697" y="53803"/>
             <a:ext cx="615950" cy="461651"/>
           </a:xfrm>
           <a:prstGeom prst="rect">
@@ -3509,7 +3581,10 @@
           <a:lstStyle/>
           <a:p>
             <a:r>
-              <a:rPr lang="en-US" sz="2400" dirty="0"/>
+              <a:rPr lang="en-US" sz="2400" dirty="0">
+                <a:latin typeface="Arial" pitchFamily="34" charset="0"/>
+                <a:cs typeface="Arial" pitchFamily="34" charset="0"/>
+              </a:rPr>
               <a:t>No</a:t>
             </a:r>
           </a:p>
@@ -3525,8 +3600,8 @@
         </p:nvSpPr>
         <p:spPr bwMode="auto">
           <a:xfrm>
-            <a:off x="5473148" y="41736"/>
-            <a:ext cx="3137452" cy="830983"/>
+            <a:off x="5521023" y="91406"/>
+            <a:ext cx="3581400" cy="830983"/>
           </a:xfrm>
           <a:prstGeom prst="rect">
             <a:avLst/>
@@ -3548,18 +3623,30 @@
           <a:lstStyle/>
           <a:p>
             <a:r>
-              <a:rPr lang="en-US" sz="2400" dirty="0" smtClean="0"/>
+              <a:rPr lang="en-US" sz="2400" dirty="0" smtClean="0">
+                <a:latin typeface="Arial" pitchFamily="34" charset="0"/>
+                <a:cs typeface="Arial" pitchFamily="34" charset="0"/>
+              </a:rPr>
               <a:t>Apply a full V</a:t>
             </a:r>
             <a:r>
-              <a:rPr lang="en-US" sz="2400" baseline="-25000" dirty="0" smtClean="0"/>
+              <a:rPr lang="en-US" sz="2400" baseline="-25000" dirty="0" smtClean="0">
+                <a:latin typeface="Arial" pitchFamily="34" charset="0"/>
+                <a:cs typeface="Arial" pitchFamily="34" charset="0"/>
+              </a:rPr>
               <a:t>RESET</a:t>
             </a:r>
             <a:r>
-              <a:rPr lang="en-US" sz="2400" dirty="0" smtClean="0"/>
+              <a:rPr lang="en-US" sz="2400" dirty="0" smtClean="0">
+                <a:latin typeface="Arial" pitchFamily="34" charset="0"/>
+                <a:cs typeface="Arial" pitchFamily="34" charset="0"/>
+              </a:rPr>
               <a:t> Pulse, and deploy H2L W&amp;V</a:t>
             </a:r>
-            <a:endParaRPr lang="en-US" sz="2400" dirty="0"/>
+            <a:endParaRPr lang="en-US" sz="2400" dirty="0">
+              <a:latin typeface="Arial" pitchFamily="34" charset="0"/>
+              <a:cs typeface="Arial" pitchFamily="34" charset="0"/>
+            </a:endParaRPr>
           </a:p>
         </p:txBody>
       </p:sp>
@@ -3600,8 +3687,8 @@
         </p:nvSpPr>
         <p:spPr bwMode="auto">
           <a:xfrm>
-            <a:off x="4495800" y="838200"/>
-            <a:ext cx="615950" cy="461651"/>
+            <a:off x="4495800" y="793595"/>
+            <a:ext cx="747432" cy="461651"/>
           </a:xfrm>
           <a:prstGeom prst="rect">
             <a:avLst/>
@@ -3615,13 +3702,16 @@
           </a:ln>
         </p:spPr>
         <p:txBody>
-          <a:bodyPr lIns="91427" tIns="45713" rIns="91427" bIns="45713">
+          <a:bodyPr wrap="square" lIns="91427" tIns="45713" rIns="91427" bIns="45713">
             <a:spAutoFit/>
           </a:bodyPr>
           <a:lstStyle/>
           <a:p>
             <a:r>
-              <a:rPr lang="en-US" sz="2400" dirty="0"/>
+              <a:rPr lang="en-US" sz="2400" dirty="0">
+                <a:latin typeface="Arial" pitchFamily="34" charset="0"/>
+                <a:cs typeface="Arial" pitchFamily="34" charset="0"/>
+              </a:rPr>
               <a:t>Yes</a:t>
             </a:r>
           </a:p>
@@ -3637,8 +3727,8 @@
         </p:nvSpPr>
         <p:spPr bwMode="auto">
           <a:xfrm>
-            <a:off x="3949148" y="1345096"/>
-            <a:ext cx="1066800" cy="830983"/>
+            <a:off x="3949147" y="1345096"/>
+            <a:ext cx="1183371" cy="830983"/>
           </a:xfrm>
           <a:prstGeom prst="rect">
             <a:avLst/>
@@ -3660,34 +3750,58 @@
           <a:lstStyle/>
           <a:p>
             <a:r>
-              <a:rPr lang="en-US" sz="2400" dirty="0" smtClean="0"/>
+              <a:rPr lang="en-US" sz="2400" dirty="0" smtClean="0">
+                <a:latin typeface="Arial" pitchFamily="34" charset="0"/>
+                <a:cs typeface="Arial" pitchFamily="34" charset="0"/>
+              </a:rPr>
               <a:t>C</a:t>
             </a:r>
             <a:r>
-              <a:rPr lang="en-US" sz="2400" baseline="-25000" dirty="0" smtClean="0"/>
+              <a:rPr lang="en-US" sz="2400" baseline="-25000" dirty="0" smtClean="0">
+                <a:latin typeface="Arial" pitchFamily="34" charset="0"/>
+                <a:cs typeface="Arial" pitchFamily="34" charset="0"/>
+              </a:rPr>
               <a:t>2</a:t>
             </a:r>
             <a:r>
-              <a:rPr lang="en-US" sz="2400" dirty="0" smtClean="0"/>
+              <a:rPr lang="en-US" sz="2400" dirty="0" smtClean="0">
+                <a:latin typeface="Arial" pitchFamily="34" charset="0"/>
+                <a:cs typeface="Arial" pitchFamily="34" charset="0"/>
+              </a:rPr>
               <a:t>C</a:t>
             </a:r>
             <a:r>
-              <a:rPr lang="en-US" sz="2400" baseline="-25000" dirty="0" smtClean="0"/>
+              <a:rPr lang="en-US" sz="2400" baseline="-25000" dirty="0" smtClean="0">
+                <a:latin typeface="Arial" pitchFamily="34" charset="0"/>
+                <a:cs typeface="Arial" pitchFamily="34" charset="0"/>
+              </a:rPr>
               <a:t>1</a:t>
             </a:r>
             <a:r>
-              <a:rPr lang="en-US" sz="2400" dirty="0" smtClean="0"/>
+              <a:rPr lang="en-US" sz="2400" dirty="0" smtClean="0">
+                <a:latin typeface="Arial" pitchFamily="34" charset="0"/>
+                <a:cs typeface="Arial" pitchFamily="34" charset="0"/>
+              </a:rPr>
               <a:t>C</a:t>
             </a:r>
             <a:r>
-              <a:rPr lang="en-US" sz="2400" baseline="-25000" dirty="0" smtClean="0"/>
+              <a:rPr lang="en-US" sz="2400" baseline="-25000" dirty="0" smtClean="0">
+                <a:latin typeface="Arial" pitchFamily="34" charset="0"/>
+                <a:cs typeface="Arial" pitchFamily="34" charset="0"/>
+              </a:rPr>
               <a:t>0</a:t>
             </a:r>
             <a:r>
-              <a:rPr lang="en-US" sz="2400" dirty="0" smtClean="0"/>
+              <a:rPr lang="en-US" sz="2400" dirty="0" smtClean="0">
+                <a:latin typeface="Arial" pitchFamily="34" charset="0"/>
+                <a:cs typeface="Arial" pitchFamily="34" charset="0"/>
+              </a:rPr>
               <a:t>=111?</a:t>
             </a:r>
-            <a:endParaRPr lang="en-US" sz="2400" dirty="0"/>
+            <a:endParaRPr lang="en-US" sz="2400" dirty="0">
+              <a:latin typeface="Arial" pitchFamily="34" charset="0"/>
+              <a:cs typeface="Arial" pitchFamily="34" charset="0"/>
+            </a:endParaRPr>
           </a:p>
         </p:txBody>
       </p:sp>
@@ -3702,7 +3816,7 @@
         <p:spPr bwMode="auto">
           <a:xfrm>
             <a:off x="2845904" y="2667000"/>
-            <a:ext cx="3276600" cy="830983"/>
+            <a:ext cx="3631096" cy="830983"/>
           </a:xfrm>
           <a:prstGeom prst="rect">
             <a:avLst/>
@@ -3724,18 +3838,44 @@
           <a:lstStyle/>
           <a:p>
             <a:r>
-              <a:rPr lang="en-US" sz="2400" dirty="0"/>
+              <a:rPr lang="en-US" sz="2400" dirty="0">
+                <a:latin typeface="Arial" pitchFamily="34" charset="0"/>
+                <a:cs typeface="Arial" pitchFamily="34" charset="0"/>
+              </a:rPr>
               <a:t>SET operation </a:t>
             </a:r>
             <a:r>
-              <a:rPr lang="en-US" sz="2400" dirty="0" smtClean="0"/>
-              <a:t>saved, directly deploy </a:t>
-            </a:r>
-            <a:r>
-              <a:rPr lang="en-US" sz="2400" dirty="0" smtClean="0"/>
-              <a:t>L2R W&amp;V</a:t>
-            </a:r>
-            <a:endParaRPr lang="en-US" sz="2400" dirty="0"/>
+              <a:rPr lang="en-US" sz="2400" dirty="0" smtClean="0">
+                <a:latin typeface="Arial" pitchFamily="34" charset="0"/>
+                <a:cs typeface="Arial" pitchFamily="34" charset="0"/>
+              </a:rPr>
+              <a:t>saved, directly </a:t>
+            </a:r>
+            <a:r>
+              <a:rPr lang="en-US" sz="2400" smtClean="0">
+                <a:latin typeface="Arial" pitchFamily="34" charset="0"/>
+                <a:cs typeface="Arial" pitchFamily="34" charset="0"/>
+              </a:rPr>
+              <a:t>deploy </a:t>
+            </a:r>
+            <a:r>
+              <a:rPr lang="en-US" sz="2400" smtClean="0">
+                <a:latin typeface="Arial" pitchFamily="34" charset="0"/>
+                <a:cs typeface="Arial" pitchFamily="34" charset="0"/>
+              </a:rPr>
+              <a:t>L2H </a:t>
+            </a:r>
+            <a:r>
+              <a:rPr lang="en-US" sz="2400" dirty="0" smtClean="0">
+                <a:latin typeface="Arial" pitchFamily="34" charset="0"/>
+                <a:cs typeface="Arial" pitchFamily="34" charset="0"/>
+              </a:rPr>
+              <a:t>W&amp;V</a:t>
+            </a:r>
+            <a:endParaRPr lang="en-US" sz="2400" dirty="0">
+              <a:latin typeface="Arial" pitchFamily="34" charset="0"/>
+              <a:cs typeface="Arial" pitchFamily="34" charset="0"/>
+            </a:endParaRPr>
           </a:p>
         </p:txBody>
       </p:sp>
@@ -3749,8 +3889,8 @@
         </p:nvSpPr>
         <p:spPr bwMode="auto">
           <a:xfrm>
-            <a:off x="5549348" y="1345096"/>
-            <a:ext cx="3061252" cy="830983"/>
+            <a:off x="5791199" y="1339390"/>
+            <a:ext cx="3311223" cy="830983"/>
           </a:xfrm>
           <a:prstGeom prst="rect">
             <a:avLst/>
@@ -3772,18 +3912,44 @@
           <a:lstStyle/>
           <a:p>
             <a:r>
-              <a:rPr lang="en-US" sz="2400" dirty="0" smtClean="0"/>
+              <a:rPr lang="en-US" sz="2400" dirty="0" smtClean="0">
+                <a:latin typeface="Arial" pitchFamily="34" charset="0"/>
+                <a:cs typeface="Arial" pitchFamily="34" charset="0"/>
+              </a:rPr>
               <a:t>Apply a full I</a:t>
             </a:r>
             <a:r>
-              <a:rPr lang="en-US" sz="2400" baseline="-25000" dirty="0" smtClean="0"/>
+              <a:rPr lang="en-US" sz="2400" baseline="-25000" dirty="0" smtClean="0">
+                <a:latin typeface="Arial" pitchFamily="34" charset="0"/>
+                <a:cs typeface="Arial" pitchFamily="34" charset="0"/>
+              </a:rPr>
               <a:t>SET</a:t>
             </a:r>
             <a:r>
-              <a:rPr lang="en-US" sz="2400" dirty="0" smtClean="0"/>
-              <a:t> Pulse, and deploy L2R W&amp;V</a:t>
-            </a:r>
-            <a:endParaRPr lang="en-US" sz="2400" dirty="0"/>
+              <a:rPr lang="en-US" sz="2400" dirty="0" smtClean="0">
+                <a:latin typeface="Arial" pitchFamily="34" charset="0"/>
+                <a:cs typeface="Arial" pitchFamily="34" charset="0"/>
+              </a:rPr>
+              <a:t> Pulse, and deploy </a:t>
+            </a:r>
+            <a:r>
+              <a:rPr lang="en-US" sz="2400" dirty="0" smtClean="0">
+                <a:latin typeface="Arial" pitchFamily="34" charset="0"/>
+                <a:cs typeface="Arial" pitchFamily="34" charset="0"/>
+              </a:rPr>
+              <a:t>L2H </a:t>
+            </a:r>
+            <a:r>
+              <a:rPr lang="en-US" sz="2400" dirty="0" smtClean="0">
+                <a:latin typeface="Arial" pitchFamily="34" charset="0"/>
+                <a:cs typeface="Arial" pitchFamily="34" charset="0"/>
+              </a:rPr>
+              <a:t>W&amp;V</a:t>
+            </a:r>
+            <a:endParaRPr lang="en-US" sz="2400" dirty="0">
+              <a:latin typeface="Arial" pitchFamily="34" charset="0"/>
+              <a:cs typeface="Arial" pitchFamily="34" charset="0"/>
+            </a:endParaRPr>
           </a:p>
         </p:txBody>
       </p:sp>
@@ -3792,13 +3958,15 @@
           <p:cNvPr id="22" name="Straight Arrow Connector 299"/>
           <p:cNvCxnSpPr>
             <a:cxnSpLocks noChangeShapeType="1"/>
+            <a:stCxn id="9" idx="3"/>
+            <a:endCxn id="16" idx="1"/>
           </p:cNvCxnSpPr>
           <p:nvPr/>
         </p:nvCxnSpPr>
         <p:spPr bwMode="auto">
-          <a:xfrm>
-            <a:off x="4939748" y="506896"/>
-            <a:ext cx="533400" cy="0"/>
+          <a:xfrm flipV="1">
+            <a:off x="5011003" y="506898"/>
+            <a:ext cx="510020" cy="2224"/>
           </a:xfrm>
           <a:prstGeom prst="straightConnector1">
             <a:avLst/>
@@ -3851,7 +4019,7 @@
         </p:nvSpPr>
         <p:spPr bwMode="auto">
           <a:xfrm>
-            <a:off x="5015948" y="1308652"/>
+            <a:off x="5126458" y="1293230"/>
             <a:ext cx="615950" cy="461651"/>
           </a:xfrm>
           <a:prstGeom prst="rect">
@@ -3872,7 +4040,10 @@
           <a:lstStyle/>
           <a:p>
             <a:r>
-              <a:rPr lang="en-US" sz="2400" dirty="0"/>
+              <a:rPr lang="en-US" sz="2400" dirty="0">
+                <a:latin typeface="Arial" pitchFamily="34" charset="0"/>
+                <a:cs typeface="Arial" pitchFamily="34" charset="0"/>
+              </a:rPr>
               <a:t>No</a:t>
             </a:r>
           </a:p>
@@ -3889,7 +4060,7 @@
         <p:spPr bwMode="auto">
           <a:xfrm>
             <a:off x="4495800" y="2209800"/>
-            <a:ext cx="615950" cy="461651"/>
+            <a:ext cx="944694" cy="461651"/>
           </a:xfrm>
           <a:prstGeom prst="rect">
             <a:avLst/>
@@ -3903,13 +4074,16 @@
           </a:ln>
         </p:spPr>
         <p:txBody>
-          <a:bodyPr lIns="91427" tIns="45713" rIns="91427" bIns="45713">
+          <a:bodyPr wrap="square" lIns="91427" tIns="45713" rIns="91427" bIns="45713">
             <a:spAutoFit/>
           </a:bodyPr>
           <a:lstStyle/>
           <a:p>
             <a:r>
-              <a:rPr lang="en-US" sz="2400" dirty="0"/>
+              <a:rPr lang="en-US" sz="2400" dirty="0">
+                <a:latin typeface="Arial" pitchFamily="34" charset="0"/>
+                <a:cs typeface="Arial" pitchFamily="34" charset="0"/>
+              </a:rPr>
               <a:t>Yes</a:t>
             </a:r>
           </a:p>
@@ -3920,13 +4094,14 @@
           <p:cNvPr id="93" name="Straight Arrow Connector 299"/>
           <p:cNvCxnSpPr>
             <a:cxnSpLocks noChangeShapeType="1"/>
+            <a:endCxn id="21" idx="1"/>
           </p:cNvCxnSpPr>
           <p:nvPr/>
         </p:nvCxnSpPr>
         <p:spPr bwMode="auto">
           <a:xfrm>
-            <a:off x="5015948" y="1726096"/>
-            <a:ext cx="533400" cy="0"/>
+            <a:off x="5132518" y="1754882"/>
+            <a:ext cx="658681" cy="0"/>
           </a:xfrm>
           <a:prstGeom prst="straightConnector1">
             <a:avLst/>
@@ -3943,6 +4118,11 @@
         </p:spPr>
       </p:cxnSp>
     </p:spTree>
+    <p:extLst>
+      <p:ext uri="{BB962C8B-B14F-4D97-AF65-F5344CB8AC3E}">
+        <p14:creationId xmlns:p14="http://schemas.microsoft.com/office/powerpoint/2010/main" val="802233076"/>
+      </p:ext>
+    </p:extLst>
   </p:cSld>
   <p:clrMapOvr>
     <a:masterClrMapping/>

</xml_diff>